<commit_message>
Powerpoint changes in design patterns
</commit_message>
<xml_diff>
--- a/Cursus/CSharp-Patterns.pptx
+++ b/Cursus/CSharp-Patterns.pptx
@@ -5384,15 +5384,7 @@
             </a:r>
             <a:r>
               <a:rPr lang="nl-BE" dirty="0"/>
-              <a:t> in object-georiënteerde talen is een manier om nieuwe objecten te </a:t>
-            </a:r>
-            <a:r>
-              <a:rPr lang="nl-BE" dirty="0" err="1"/>
-              <a:t>instantieëren</a:t>
-            </a:r>
-            <a:r>
-              <a:rPr lang="nl-BE" dirty="0"/>
-              <a:t> zonder exact te weten van welke klasse deze objecten zullen zijn, zolang deze overgeërfd zijn van een bepaalde basisklasse of interface.</a:t>
+              <a:t> in object-georiënteerde talen is een manier om nieuwe objecten te instantiëren zonder exact te weten van welke klasse deze objecten zullen zijn, zolang deze overgeërfd zijn van een bepaalde basisklasse of interface.</a:t>
             </a:r>
           </a:p>
           <a:p>

</xml_diff>